<commit_message>
Changes on instructor slide
</commit_message>
<xml_diff>
--- a/Implement and Design Websites/Implement and Design WebSites.pptx
+++ b/Implement and Design Websites/Implement and Design WebSites.pptx
@@ -3899,7 +3899,7 @@
           <a:p>
             <a:fld id="{32AF8DFE-3F9E-4E76-8DEB-FC1A7CECE63A}" type="datetimeFigureOut">
               <a:rPr lang="en-US" smtClean="0"/>
-              <a:t>9/18/2016</a:t>
+              <a:t>9/25/2016</a:t>
             </a:fld>
             <a:endParaRPr lang="en-US"/>
           </a:p>
@@ -5436,7 +5436,7 @@
           <a:p>
             <a:fld id="{51B45C6E-FCE4-4C36-96D3-F66438DBAEBD}" type="datetime1">
               <a:rPr lang="en-US" smtClean="0"/>
-              <a:t>9/18/2016</a:t>
+              <a:t>9/25/2016</a:t>
             </a:fld>
             <a:endParaRPr lang="en-US"/>
           </a:p>
@@ -8479,7 +8479,7 @@
           <a:p>
             <a:fld id="{51B45C6E-FCE4-4C36-96D3-F66438DBAEBD}" type="datetime1">
               <a:rPr lang="en-US" smtClean="0"/>
-              <a:t>9/18/2016</a:t>
+              <a:t>9/25/2016</a:t>
             </a:fld>
             <a:endParaRPr lang="en-US"/>
           </a:p>
@@ -13967,7 +13967,7 @@
             <a:noFill/>
             <a:extLst>
               <a:ext uri="{909E8E84-426E-40dd-AFC4-6F175D3DCCD1}">
-                <a14:hiddenFill xmlns="" xmlns:a14="http://schemas.microsoft.com/office/drawing/2010/main">
+                <a14:hiddenFill xmlns:a14="http://schemas.microsoft.com/office/drawing/2010/main" xmlns="">
                   <a:solidFill>
                     <a:srgbClr val="FFFFFF"/>
                   </a:solidFill>
@@ -14025,7 +14025,7 @@
             <a:noFill/>
             <a:extLst>
               <a:ext uri="{909E8E84-426E-40dd-AFC4-6F175D3DCCD1}">
-                <a14:hiddenFill xmlns="" xmlns:a14="http://schemas.microsoft.com/office/drawing/2010/main">
+                <a14:hiddenFill xmlns:a14="http://schemas.microsoft.com/office/drawing/2010/main" xmlns="">
                   <a:solidFill>
                     <a:srgbClr val="FFFFFF"/>
                   </a:solidFill>
@@ -14089,7 +14089,7 @@
             <a:noFill/>
             <a:extLst>
               <a:ext uri="{909E8E84-426E-40dd-AFC4-6F175D3DCCD1}">
-                <a14:hiddenFill xmlns="" xmlns:a14="http://schemas.microsoft.com/office/drawing/2010/main">
+                <a14:hiddenFill xmlns:a14="http://schemas.microsoft.com/office/drawing/2010/main" xmlns="">
                   <a:solidFill>
                     <a:srgbClr val="FFFFFF"/>
                   </a:solidFill>
@@ -16536,7 +16536,7 @@
           <a:noFill/>
           <a:extLst>
             <a:ext uri="{909E8E84-426E-40dd-AFC4-6F175D3DCCD1}">
-              <a14:hiddenFill xmlns="" xmlns:a14="http://schemas.microsoft.com/office/drawing/2010/main">
+              <a14:hiddenFill xmlns:a14="http://schemas.microsoft.com/office/drawing/2010/main" xmlns="">
                 <a:solidFill>
                   <a:srgbClr val="FFFFFF"/>
                 </a:solidFill>
@@ -24078,39 +24078,12 @@
           <a:p>
             <a:r>
               <a:rPr lang="pt-BR" dirty="0"/>
-              <a:t>Sex </a:t>
-            </a:r>
-            <a:r>
-              <a:rPr lang="pt-BR" dirty="0" err="1"/>
-              <a:t>Machine</a:t>
-            </a:r>
-            <a:endParaRPr lang="pt-BR" dirty="0"/>
-          </a:p>
-          <a:p>
-            <a:r>
-              <a:rPr lang="pt-BR" dirty="0"/>
-              <a:t>Um cara muito foda</a:t>
-            </a:r>
-          </a:p>
-          <a:p>
-            <a:r>
-              <a:rPr lang="pt-BR" dirty="0"/>
-              <a:t>Jogador de Basquete</a:t>
-            </a:r>
-          </a:p>
-          <a:p>
-            <a:r>
-              <a:rPr lang="pt-BR" dirty="0"/>
-              <a:t>Um cara muito foda</a:t>
-            </a:r>
-          </a:p>
-          <a:p>
-            <a:r>
-              <a:rPr lang="pt-BR" dirty="0"/>
-              <a:t>Humilde e modesto</a:t>
-            </a:r>
-          </a:p>
-          <a:p>
+              <a:t>Colocar informações sobre </a:t>
+            </a:r>
+            <a:r>
+              <a:rPr lang="pt-BR"/>
+              <a:t>o instrutor aqui</a:t>
+            </a:r>
             <a:endParaRPr lang="en-US" dirty="0"/>
           </a:p>
         </p:txBody>

</xml_diff>